<commit_message>
ResolutionFolder applied only to *.sql files
</commit_message>
<xml_diff>
--- a/presentations/NYC F# UG. 2014-08-26.pptx
+++ b/presentations/NYC F# UG. 2014-08-26.pptx
@@ -170,7 +170,7 @@
           <a:noFill/>
           <a:extLst>
             <a:ext uri="{909E8E84-426E-40dd-AFC4-6F175D3DCCD1}">
-              <a14:hiddenFill xmlns="" xmlns:a14="http://schemas.microsoft.com/office/drawing/2010/main">
+              <a14:hiddenFill xmlns:a14="http://schemas.microsoft.com/office/drawing/2010/main" xmlns="">
                 <a:solidFill>
                   <a:srgbClr val="FFFFFF"/>
                 </a:solidFill>
@@ -230,7 +230,7 @@
             </a:ln>
             <a:extLst>
               <a:ext uri="{91240B29-F687-4f45-9708-019B960494DF}">
-                <a14:hiddenLine xmlns="" xmlns:a14="http://schemas.microsoft.com/office/drawing/2010/main" w="9525">
+                <a14:hiddenLine xmlns:a14="http://schemas.microsoft.com/office/drawing/2010/main" xmlns="" w="9525">
                   <a:solidFill>
                     <a:srgbClr val="000000"/>
                   </a:solidFill>
@@ -320,7 +320,7 @@
             </a:ln>
             <a:extLst>
               <a:ext uri="{91240B29-F687-4f45-9708-019B960494DF}">
-                <a14:hiddenLine xmlns="" xmlns:a14="http://schemas.microsoft.com/office/drawing/2010/main" w="9525">
+                <a14:hiddenLine xmlns:a14="http://schemas.microsoft.com/office/drawing/2010/main" xmlns="" w="9525">
                   <a:solidFill>
                     <a:srgbClr val="000000"/>
                   </a:solidFill>
@@ -410,7 +410,7 @@
             </a:ln>
             <a:extLst>
               <a:ext uri="{91240B29-F687-4f45-9708-019B960494DF}">
-                <a14:hiddenLine xmlns="" xmlns:a14="http://schemas.microsoft.com/office/drawing/2010/main" w="9525">
+                <a14:hiddenLine xmlns:a14="http://schemas.microsoft.com/office/drawing/2010/main" xmlns="" w="9525">
                   <a:solidFill>
                     <a:srgbClr val="000000"/>
                   </a:solidFill>
@@ -444,7 +444,7 @@
             </a:ln>
             <a:extLst>
               <a:ext uri="{91240B29-F687-4f45-9708-019B960494DF}">
-                <a14:hiddenLine xmlns="" xmlns:a14="http://schemas.microsoft.com/office/drawing/2010/main" w="9525">
+                <a14:hiddenLine xmlns:a14="http://schemas.microsoft.com/office/drawing/2010/main" xmlns="" w="9525">
                   <a:solidFill>
                     <a:srgbClr val="000000"/>
                   </a:solidFill>
@@ -534,7 +534,7 @@
             </a:ln>
             <a:extLst>
               <a:ext uri="{91240B29-F687-4f45-9708-019B960494DF}">
-                <a14:hiddenLine xmlns="" xmlns:a14="http://schemas.microsoft.com/office/drawing/2010/main" w="9525">
+                <a14:hiddenLine xmlns:a14="http://schemas.microsoft.com/office/drawing/2010/main" xmlns="" w="9525">
                   <a:solidFill>
                     <a:srgbClr val="000000"/>
                   </a:solidFill>
@@ -596,7 +596,7 @@
             </a:ln>
             <a:extLst>
               <a:ext uri="{91240B29-F687-4f45-9708-019B960494DF}">
-                <a14:hiddenLine xmlns="" xmlns:a14="http://schemas.microsoft.com/office/drawing/2010/main" w="9525">
+                <a14:hiddenLine xmlns:a14="http://schemas.microsoft.com/office/drawing/2010/main" xmlns="" w="9525">
                   <a:solidFill>
                     <a:srgbClr val="000000"/>
                   </a:solidFill>
@@ -658,7 +658,7 @@
             </a:ln>
             <a:extLst>
               <a:ext uri="{91240B29-F687-4f45-9708-019B960494DF}">
-                <a14:hiddenLine xmlns="" xmlns:a14="http://schemas.microsoft.com/office/drawing/2010/main" w="9525">
+                <a14:hiddenLine xmlns:a14="http://schemas.microsoft.com/office/drawing/2010/main" xmlns="" w="9525">
                   <a:solidFill>
                     <a:srgbClr val="000000"/>
                   </a:solidFill>
@@ -748,7 +748,7 @@
             </a:ln>
             <a:extLst>
               <a:ext uri="{91240B29-F687-4f45-9708-019B960494DF}">
-                <a14:hiddenLine xmlns="" xmlns:a14="http://schemas.microsoft.com/office/drawing/2010/main" w="9525">
+                <a14:hiddenLine xmlns:a14="http://schemas.microsoft.com/office/drawing/2010/main" xmlns="" w="9525">
                   <a:solidFill>
                     <a:srgbClr val="000000"/>
                   </a:solidFill>
@@ -810,7 +810,7 @@
             </a:ln>
             <a:extLst>
               <a:ext uri="{91240B29-F687-4f45-9708-019B960494DF}">
-                <a14:hiddenLine xmlns="" xmlns:a14="http://schemas.microsoft.com/office/drawing/2010/main" w="9525">
+                <a14:hiddenLine xmlns:a14="http://schemas.microsoft.com/office/drawing/2010/main" xmlns="" w="9525">
                   <a:solidFill>
                     <a:srgbClr val="000000"/>
                   </a:solidFill>
@@ -872,7 +872,7 @@
             </a:ln>
             <a:extLst>
               <a:ext uri="{91240B29-F687-4f45-9708-019B960494DF}">
-                <a14:hiddenLine xmlns="" xmlns:a14="http://schemas.microsoft.com/office/drawing/2010/main" w="9525">
+                <a14:hiddenLine xmlns:a14="http://schemas.microsoft.com/office/drawing/2010/main" xmlns="" w="9525">
                   <a:solidFill>
                     <a:srgbClr val="000000"/>
                   </a:solidFill>
@@ -962,7 +962,7 @@
             </a:ln>
             <a:extLst>
               <a:ext uri="{91240B29-F687-4f45-9708-019B960494DF}">
-                <a14:hiddenLine xmlns="" xmlns:a14="http://schemas.microsoft.com/office/drawing/2010/main" w="9525">
+                <a14:hiddenLine xmlns:a14="http://schemas.microsoft.com/office/drawing/2010/main" xmlns="" w="9525">
                   <a:solidFill>
                     <a:srgbClr val="000000"/>
                   </a:solidFill>
@@ -1052,7 +1052,7 @@
             </a:ln>
             <a:extLst>
               <a:ext uri="{91240B29-F687-4f45-9708-019B960494DF}">
-                <a14:hiddenLine xmlns="" xmlns:a14="http://schemas.microsoft.com/office/drawing/2010/main" w="9525">
+                <a14:hiddenLine xmlns:a14="http://schemas.microsoft.com/office/drawing/2010/main" xmlns="" w="9525">
                   <a:solidFill>
                     <a:srgbClr val="000000"/>
                   </a:solidFill>
@@ -1114,7 +1114,7 @@
             </a:ln>
             <a:extLst>
               <a:ext uri="{91240B29-F687-4f45-9708-019B960494DF}">
-                <a14:hiddenLine xmlns="" xmlns:a14="http://schemas.microsoft.com/office/drawing/2010/main" w="9525">
+                <a14:hiddenLine xmlns:a14="http://schemas.microsoft.com/office/drawing/2010/main" xmlns="" w="9525">
                   <a:solidFill>
                     <a:srgbClr val="000000"/>
                   </a:solidFill>
@@ -1224,7 +1224,7 @@
             </a:ln>
             <a:extLst>
               <a:ext uri="{91240B29-F687-4f45-9708-019B960494DF}">
-                <a14:hiddenLine xmlns="" xmlns:a14="http://schemas.microsoft.com/office/drawing/2010/main" w="9525">
+                <a14:hiddenLine xmlns:a14="http://schemas.microsoft.com/office/drawing/2010/main" xmlns="" w="9525">
                   <a:solidFill>
                     <a:srgbClr val="000000"/>
                   </a:solidFill>
@@ -1286,7 +1286,7 @@
             </a:ln>
             <a:extLst>
               <a:ext uri="{91240B29-F687-4f45-9708-019B960494DF}">
-                <a14:hiddenLine xmlns="" xmlns:a14="http://schemas.microsoft.com/office/drawing/2010/main" w="9525">
+                <a14:hiddenLine xmlns:a14="http://schemas.microsoft.com/office/drawing/2010/main" xmlns="" w="9525">
                   <a:solidFill>
                     <a:srgbClr val="000000"/>
                   </a:solidFill>
@@ -1376,7 +1376,7 @@
             </a:ln>
             <a:extLst>
               <a:ext uri="{91240B29-F687-4f45-9708-019B960494DF}">
-                <a14:hiddenLine xmlns="" xmlns:a14="http://schemas.microsoft.com/office/drawing/2010/main" w="9525">
+                <a14:hiddenLine xmlns:a14="http://schemas.microsoft.com/office/drawing/2010/main" xmlns="" w="9525">
                   <a:solidFill>
                     <a:srgbClr val="000000"/>
                   </a:solidFill>
@@ -1466,7 +1466,7 @@
             </a:ln>
             <a:extLst>
               <a:ext uri="{91240B29-F687-4f45-9708-019B960494DF}">
-                <a14:hiddenLine xmlns="" xmlns:a14="http://schemas.microsoft.com/office/drawing/2010/main" w="9525">
+                <a14:hiddenLine xmlns:a14="http://schemas.microsoft.com/office/drawing/2010/main" xmlns="" w="9525">
                   <a:solidFill>
                     <a:srgbClr val="000000"/>
                   </a:solidFill>
@@ -1528,7 +1528,7 @@
             </a:ln>
             <a:extLst>
               <a:ext uri="{91240B29-F687-4f45-9708-019B960494DF}">
-                <a14:hiddenLine xmlns="" xmlns:a14="http://schemas.microsoft.com/office/drawing/2010/main" w="9525">
+                <a14:hiddenLine xmlns:a14="http://schemas.microsoft.com/office/drawing/2010/main" xmlns="" w="9525">
                   <a:solidFill>
                     <a:srgbClr val="000000"/>
                   </a:solidFill>
@@ -1618,7 +1618,7 @@
             </a:ln>
             <a:extLst>
               <a:ext uri="{91240B29-F687-4f45-9708-019B960494DF}">
-                <a14:hiddenLine xmlns="" xmlns:a14="http://schemas.microsoft.com/office/drawing/2010/main" w="9525">
+                <a14:hiddenLine xmlns:a14="http://schemas.microsoft.com/office/drawing/2010/main" xmlns="" w="9525">
                   <a:solidFill>
                     <a:srgbClr val="000000"/>
                   </a:solidFill>
@@ -1708,7 +1708,7 @@
             </a:ln>
             <a:extLst>
               <a:ext uri="{91240B29-F687-4f45-9708-019B960494DF}">
-                <a14:hiddenLine xmlns="" xmlns:a14="http://schemas.microsoft.com/office/drawing/2010/main" w="9525">
+                <a14:hiddenLine xmlns:a14="http://schemas.microsoft.com/office/drawing/2010/main" xmlns="" w="9525">
                   <a:solidFill>
                     <a:srgbClr val="000000"/>
                   </a:solidFill>
@@ -1764,7 +1764,7 @@
             </a:ln>
             <a:extLst>
               <a:ext uri="{91240B29-F687-4f45-9708-019B960494DF}">
-                <a14:hiddenLine xmlns="" xmlns:a14="http://schemas.microsoft.com/office/drawing/2010/main" w="9525">
+                <a14:hiddenLine xmlns:a14="http://schemas.microsoft.com/office/drawing/2010/main" xmlns="" w="9525">
                   <a:solidFill>
                     <a:srgbClr val="000000"/>
                   </a:solidFill>
@@ -1854,7 +1854,7 @@
             </a:ln>
             <a:extLst>
               <a:ext uri="{91240B29-F687-4f45-9708-019B960494DF}">
-                <a14:hiddenLine xmlns="" xmlns:a14="http://schemas.microsoft.com/office/drawing/2010/main" w="9525">
+                <a14:hiddenLine xmlns:a14="http://schemas.microsoft.com/office/drawing/2010/main" xmlns="" w="9525">
                   <a:solidFill>
                     <a:srgbClr val="000000"/>
                   </a:solidFill>
@@ -1910,7 +1910,7 @@
             </a:ln>
             <a:extLst>
               <a:ext uri="{91240B29-F687-4f45-9708-019B960494DF}">
-                <a14:hiddenLine xmlns="" xmlns:a14="http://schemas.microsoft.com/office/drawing/2010/main" w="9525">
+                <a14:hiddenLine xmlns:a14="http://schemas.microsoft.com/office/drawing/2010/main" xmlns="" w="9525">
                   <a:solidFill>
                     <a:srgbClr val="000000"/>
                   </a:solidFill>
@@ -2000,7 +2000,7 @@
             </a:ln>
             <a:extLst>
               <a:ext uri="{91240B29-F687-4f45-9708-019B960494DF}">
-                <a14:hiddenLine xmlns="" xmlns:a14="http://schemas.microsoft.com/office/drawing/2010/main" w="9525">
+                <a14:hiddenLine xmlns:a14="http://schemas.microsoft.com/office/drawing/2010/main" xmlns="" w="9525">
                   <a:solidFill>
                     <a:srgbClr val="000000"/>
                   </a:solidFill>
@@ -2068,7 +2068,7 @@
             </a:ln>
             <a:extLst>
               <a:ext uri="{91240B29-F687-4f45-9708-019B960494DF}">
-                <a14:hiddenLine xmlns="" xmlns:a14="http://schemas.microsoft.com/office/drawing/2010/main" w="9525">
+                <a14:hiddenLine xmlns:a14="http://schemas.microsoft.com/office/drawing/2010/main" xmlns="" w="9525">
                   <a:solidFill>
                     <a:srgbClr val="000000"/>
                   </a:solidFill>
@@ -2158,7 +2158,7 @@
             </a:ln>
             <a:extLst>
               <a:ext uri="{91240B29-F687-4f45-9708-019B960494DF}">
-                <a14:hiddenLine xmlns="" xmlns:a14="http://schemas.microsoft.com/office/drawing/2010/main" w="9525">
+                <a14:hiddenLine xmlns:a14="http://schemas.microsoft.com/office/drawing/2010/main" xmlns="" w="9525">
                   <a:solidFill>
                     <a:srgbClr val="000000"/>
                   </a:solidFill>
@@ -2226,7 +2226,7 @@
             </a:ln>
             <a:extLst>
               <a:ext uri="{91240B29-F687-4f45-9708-019B960494DF}">
-                <a14:hiddenLine xmlns="" xmlns:a14="http://schemas.microsoft.com/office/drawing/2010/main" w="9525">
+                <a14:hiddenLine xmlns:a14="http://schemas.microsoft.com/office/drawing/2010/main" xmlns="" w="9525">
                   <a:solidFill>
                     <a:srgbClr val="000000"/>
                   </a:solidFill>
@@ -2316,7 +2316,7 @@
             </a:ln>
             <a:extLst>
               <a:ext uri="{91240B29-F687-4f45-9708-019B960494DF}">
-                <a14:hiddenLine xmlns="" xmlns:a14="http://schemas.microsoft.com/office/drawing/2010/main" w="9525">
+                <a14:hiddenLine xmlns:a14="http://schemas.microsoft.com/office/drawing/2010/main" xmlns="" w="9525">
                   <a:solidFill>
                     <a:srgbClr val="000000"/>
                   </a:solidFill>
@@ -2350,7 +2350,7 @@
             </a:ln>
             <a:extLst>
               <a:ext uri="{91240B29-F687-4f45-9708-019B960494DF}">
-                <a14:hiddenLine xmlns="" xmlns:a14="http://schemas.microsoft.com/office/drawing/2010/main" w="9525">
+                <a14:hiddenLine xmlns:a14="http://schemas.microsoft.com/office/drawing/2010/main" xmlns="" w="9525">
                   <a:solidFill>
                     <a:srgbClr val="000000"/>
                   </a:solidFill>
@@ -2440,7 +2440,7 @@
             </a:ln>
             <a:extLst>
               <a:ext uri="{91240B29-F687-4f45-9708-019B960494DF}">
-                <a14:hiddenLine xmlns="" xmlns:a14="http://schemas.microsoft.com/office/drawing/2010/main" w="9525">
+                <a14:hiddenLine xmlns:a14="http://schemas.microsoft.com/office/drawing/2010/main" xmlns="" w="9525">
                   <a:solidFill>
                     <a:srgbClr val="000000"/>
                   </a:solidFill>
@@ -2502,7 +2502,7 @@
             </a:ln>
             <a:extLst>
               <a:ext uri="{91240B29-F687-4f45-9708-019B960494DF}">
-                <a14:hiddenLine xmlns="" xmlns:a14="http://schemas.microsoft.com/office/drawing/2010/main" w="9525">
+                <a14:hiddenLine xmlns:a14="http://schemas.microsoft.com/office/drawing/2010/main" xmlns="" w="9525">
                   <a:solidFill>
                     <a:srgbClr val="000000"/>
                   </a:solidFill>
@@ -2564,7 +2564,7 @@
             </a:ln>
             <a:extLst>
               <a:ext uri="{91240B29-F687-4f45-9708-019B960494DF}">
-                <a14:hiddenLine xmlns="" xmlns:a14="http://schemas.microsoft.com/office/drawing/2010/main" w="9525">
+                <a14:hiddenLine xmlns:a14="http://schemas.microsoft.com/office/drawing/2010/main" xmlns="" w="9525">
                   <a:solidFill>
                     <a:srgbClr val="000000"/>
                   </a:solidFill>
@@ -2654,7 +2654,7 @@
             </a:ln>
             <a:extLst>
               <a:ext uri="{91240B29-F687-4f45-9708-019B960494DF}">
-                <a14:hiddenLine xmlns="" xmlns:a14="http://schemas.microsoft.com/office/drawing/2010/main" w="9525">
+                <a14:hiddenLine xmlns:a14="http://schemas.microsoft.com/office/drawing/2010/main" xmlns="" w="9525">
                   <a:solidFill>
                     <a:srgbClr val="000000"/>
                   </a:solidFill>
@@ -2722,7 +2722,7 @@
             </a:ln>
             <a:extLst>
               <a:ext uri="{91240B29-F687-4f45-9708-019B960494DF}">
-                <a14:hiddenLine xmlns="" xmlns:a14="http://schemas.microsoft.com/office/drawing/2010/main" w="9525">
+                <a14:hiddenLine xmlns:a14="http://schemas.microsoft.com/office/drawing/2010/main" xmlns="" w="9525">
                   <a:solidFill>
                     <a:srgbClr val="000000"/>
                   </a:solidFill>
@@ -2784,7 +2784,7 @@
             </a:ln>
             <a:extLst>
               <a:ext uri="{91240B29-F687-4f45-9708-019B960494DF}">
-                <a14:hiddenLine xmlns="" xmlns:a14="http://schemas.microsoft.com/office/drawing/2010/main" w="9525">
+                <a14:hiddenLine xmlns:a14="http://schemas.microsoft.com/office/drawing/2010/main" xmlns="" w="9525">
                   <a:solidFill>
                     <a:srgbClr val="000000"/>
                   </a:solidFill>
@@ -2874,7 +2874,7 @@
             </a:ln>
             <a:extLst>
               <a:ext uri="{91240B29-F687-4f45-9708-019B960494DF}">
-                <a14:hiddenLine xmlns="" xmlns:a14="http://schemas.microsoft.com/office/drawing/2010/main" w="9525">
+                <a14:hiddenLine xmlns:a14="http://schemas.microsoft.com/office/drawing/2010/main" xmlns="" w="9525">
                   <a:solidFill>
                     <a:srgbClr val="000000"/>
                   </a:solidFill>
@@ -2936,7 +2936,7 @@
             </a:ln>
             <a:extLst>
               <a:ext uri="{91240B29-F687-4f45-9708-019B960494DF}">
-                <a14:hiddenLine xmlns="" xmlns:a14="http://schemas.microsoft.com/office/drawing/2010/main" w="9525">
+                <a14:hiddenLine xmlns:a14="http://schemas.microsoft.com/office/drawing/2010/main" xmlns="" w="9525">
                   <a:solidFill>
                     <a:srgbClr val="000000"/>
                   </a:solidFill>
@@ -3026,7 +3026,7 @@
             </a:ln>
             <a:extLst>
               <a:ext uri="{91240B29-F687-4f45-9708-019B960494DF}">
-                <a14:hiddenLine xmlns="" xmlns:a14="http://schemas.microsoft.com/office/drawing/2010/main" w="9525">
+                <a14:hiddenLine xmlns:a14="http://schemas.microsoft.com/office/drawing/2010/main" xmlns="" w="9525">
                   <a:solidFill>
                     <a:srgbClr val="000000"/>
                   </a:solidFill>
@@ -3088,7 +3088,7 @@
             </a:ln>
             <a:extLst>
               <a:ext uri="{91240B29-F687-4f45-9708-019B960494DF}">
-                <a14:hiddenLine xmlns="" xmlns:a14="http://schemas.microsoft.com/office/drawing/2010/main" w="9525">
+                <a14:hiddenLine xmlns:a14="http://schemas.microsoft.com/office/drawing/2010/main" xmlns="" w="9525">
                   <a:solidFill>
                     <a:srgbClr val="000000"/>
                   </a:solidFill>
@@ -3178,7 +3178,7 @@
             </a:ln>
             <a:extLst>
               <a:ext uri="{91240B29-F687-4f45-9708-019B960494DF}">
-                <a14:hiddenLine xmlns="" xmlns:a14="http://schemas.microsoft.com/office/drawing/2010/main" w="9525">
+                <a14:hiddenLine xmlns:a14="http://schemas.microsoft.com/office/drawing/2010/main" xmlns="" w="9525">
                   <a:solidFill>
                     <a:srgbClr val="000000"/>
                   </a:solidFill>
@@ -3212,7 +3212,7 @@
             </a:ln>
             <a:extLst>
               <a:ext uri="{91240B29-F687-4f45-9708-019B960494DF}">
-                <a14:hiddenLine xmlns="" xmlns:a14="http://schemas.microsoft.com/office/drawing/2010/main" w="9525">
+                <a14:hiddenLine xmlns:a14="http://schemas.microsoft.com/office/drawing/2010/main" xmlns="" w="9525">
                   <a:solidFill>
                     <a:srgbClr val="000000"/>
                   </a:solidFill>
@@ -3277,7 +3277,7 @@
             </a:ln>
             <a:extLst>
               <a:ext uri="{91240B29-F687-4f45-9708-019B960494DF}">
-                <a14:hiddenLine xmlns="" xmlns:a14="http://schemas.microsoft.com/office/drawing/2010/main" w="9525">
+                <a14:hiddenLine xmlns:a14="http://schemas.microsoft.com/office/drawing/2010/main" xmlns="" w="9525">
                   <a:solidFill>
                     <a:srgbClr val="000000"/>
                   </a:solidFill>
@@ -3367,7 +3367,7 @@
             </a:ln>
             <a:extLst>
               <a:ext uri="{91240B29-F687-4f45-9708-019B960494DF}">
-                <a14:hiddenLine xmlns="" xmlns:a14="http://schemas.microsoft.com/office/drawing/2010/main" w="9525">
+                <a14:hiddenLine xmlns:a14="http://schemas.microsoft.com/office/drawing/2010/main" xmlns="" w="9525">
                   <a:solidFill>
                     <a:srgbClr val="000000"/>
                   </a:solidFill>
@@ -3429,7 +3429,7 @@
             </a:ln>
             <a:extLst>
               <a:ext uri="{91240B29-F687-4f45-9708-019B960494DF}">
-                <a14:hiddenLine xmlns="" xmlns:a14="http://schemas.microsoft.com/office/drawing/2010/main" w="9525">
+                <a14:hiddenLine xmlns:a14="http://schemas.microsoft.com/office/drawing/2010/main" xmlns="" w="9525">
                   <a:solidFill>
                     <a:srgbClr val="000000"/>
                   </a:solidFill>
@@ -3519,7 +3519,7 @@
             </a:ln>
             <a:extLst>
               <a:ext uri="{91240B29-F687-4f45-9708-019B960494DF}">
-                <a14:hiddenLine xmlns="" xmlns:a14="http://schemas.microsoft.com/office/drawing/2010/main" w="9525">
+                <a14:hiddenLine xmlns:a14="http://schemas.microsoft.com/office/drawing/2010/main" xmlns="" w="9525">
                   <a:solidFill>
                     <a:srgbClr val="000000"/>
                   </a:solidFill>
@@ -3609,7 +3609,7 @@
             </a:ln>
             <a:extLst>
               <a:ext uri="{91240B29-F687-4f45-9708-019B960494DF}">
-                <a14:hiddenLine xmlns="" xmlns:a14="http://schemas.microsoft.com/office/drawing/2010/main" w="9525">
+                <a14:hiddenLine xmlns:a14="http://schemas.microsoft.com/office/drawing/2010/main" xmlns="" w="9525">
                   <a:solidFill>
                     <a:srgbClr val="000000"/>
                   </a:solidFill>
@@ -3674,7 +3674,7 @@
             </a:ln>
             <a:extLst>
               <a:ext uri="{91240B29-F687-4f45-9708-019B960494DF}">
-                <a14:hiddenLine xmlns="" xmlns:a14="http://schemas.microsoft.com/office/drawing/2010/main" w="9525">
+                <a14:hiddenLine xmlns:a14="http://schemas.microsoft.com/office/drawing/2010/main" xmlns="" w="9525">
                   <a:solidFill>
                     <a:srgbClr val="000000"/>
                   </a:solidFill>
@@ -3736,7 +3736,7 @@
             </a:ln>
             <a:extLst>
               <a:ext uri="{91240B29-F687-4f45-9708-019B960494DF}">
-                <a14:hiddenLine xmlns="" xmlns:a14="http://schemas.microsoft.com/office/drawing/2010/main" w="9525">
+                <a14:hiddenLine xmlns:a14="http://schemas.microsoft.com/office/drawing/2010/main" xmlns="" w="9525">
                   <a:solidFill>
                     <a:srgbClr val="000000"/>
                   </a:solidFill>
@@ -3826,7 +3826,7 @@
             </a:ln>
             <a:extLst>
               <a:ext uri="{91240B29-F687-4f45-9708-019B960494DF}">
-                <a14:hiddenLine xmlns="" xmlns:a14="http://schemas.microsoft.com/office/drawing/2010/main" w="9525">
+                <a14:hiddenLine xmlns:a14="http://schemas.microsoft.com/office/drawing/2010/main" xmlns="" w="9525">
                   <a:solidFill>
                     <a:srgbClr val="000000"/>
                   </a:solidFill>
@@ -3916,7 +3916,7 @@
             </a:ln>
             <a:extLst>
               <a:ext uri="{91240B29-F687-4f45-9708-019B960494DF}">
-                <a14:hiddenLine xmlns="" xmlns:a14="http://schemas.microsoft.com/office/drawing/2010/main" w="9525">
+                <a14:hiddenLine xmlns:a14="http://schemas.microsoft.com/office/drawing/2010/main" xmlns="" w="9525">
                   <a:solidFill>
                     <a:srgbClr val="000000"/>
                   </a:solidFill>
@@ -3978,7 +3978,7 @@
             </a:ln>
             <a:extLst>
               <a:ext uri="{91240B29-F687-4f45-9708-019B960494DF}">
-                <a14:hiddenLine xmlns="" xmlns:a14="http://schemas.microsoft.com/office/drawing/2010/main" w="9525">
+                <a14:hiddenLine xmlns:a14="http://schemas.microsoft.com/office/drawing/2010/main" xmlns="" w="9525">
                   <a:solidFill>
                     <a:srgbClr val="000000"/>
                   </a:solidFill>
@@ -4098,7 +4098,7 @@
             </a:ln>
             <a:extLst>
               <a:ext uri="{91240B29-F687-4f45-9708-019B960494DF}">
-                <a14:hiddenLine xmlns="" xmlns:a14="http://schemas.microsoft.com/office/drawing/2010/main" w="9525">
+                <a14:hiddenLine xmlns:a14="http://schemas.microsoft.com/office/drawing/2010/main" xmlns="" w="9525">
                   <a:solidFill>
                     <a:srgbClr val="000000"/>
                   </a:solidFill>
@@ -4166,7 +4166,7 @@
             </a:ln>
             <a:extLst>
               <a:ext uri="{91240B29-F687-4f45-9708-019B960494DF}">
-                <a14:hiddenLine xmlns="" xmlns:a14="http://schemas.microsoft.com/office/drawing/2010/main" w="9525">
+                <a14:hiddenLine xmlns:a14="http://schemas.microsoft.com/office/drawing/2010/main" xmlns="" w="9525">
                   <a:solidFill>
                     <a:srgbClr val="000000"/>
                   </a:solidFill>
@@ -4256,7 +4256,7 @@
             </a:ln>
             <a:extLst>
               <a:ext uri="{91240B29-F687-4f45-9708-019B960494DF}">
-                <a14:hiddenLine xmlns="" xmlns:a14="http://schemas.microsoft.com/office/drawing/2010/main" w="9525">
+                <a14:hiddenLine xmlns:a14="http://schemas.microsoft.com/office/drawing/2010/main" xmlns="" w="9525">
                   <a:solidFill>
                     <a:srgbClr val="000000"/>
                   </a:solidFill>
@@ -4397,7 +4397,7 @@
             <a:fld id="{B61BEF0D-F0BB-DE4B-95CE-6DB70DBA9567}" type="datetimeFigureOut">
               <a:rPr lang="en-US" smtClean="0"/>
               <a:pPr/>
-              <a:t>8/11/2014</a:t>
+              <a:t>8/12/2014</a:t>
             </a:fld>
             <a:endParaRPr lang="en-US" dirty="0"/>
           </a:p>
@@ -4666,7 +4666,7 @@
             <a:fld id="{B61BEF0D-F0BB-DE4B-95CE-6DB70DBA9567}" type="datetimeFigureOut">
               <a:rPr lang="en-US" smtClean="0"/>
               <a:pPr/>
-              <a:t>8/11/2014</a:t>
+              <a:t>8/12/2014</a:t>
             </a:fld>
             <a:endParaRPr lang="en-US" dirty="0"/>
           </a:p>
@@ -4864,7 +4864,7 @@
             <a:fld id="{B61BEF0D-F0BB-DE4B-95CE-6DB70DBA9567}" type="datetimeFigureOut">
               <a:rPr lang="en-US" smtClean="0"/>
               <a:pPr/>
-              <a:t>8/11/2014</a:t>
+              <a:t>8/12/2014</a:t>
             </a:fld>
             <a:endParaRPr lang="en-US" dirty="0"/>
           </a:p>
@@ -5129,7 +5129,7 @@
             <a:fld id="{B61BEF0D-F0BB-DE4B-95CE-6DB70DBA9567}" type="datetimeFigureOut">
               <a:rPr lang="en-US" smtClean="0"/>
               <a:pPr/>
-              <a:t>8/11/2014</a:t>
+              <a:t>8/12/2014</a:t>
             </a:fld>
             <a:endParaRPr lang="en-US" dirty="0"/>
           </a:p>
@@ -5565,7 +5565,7 @@
             <a:fld id="{B61BEF0D-F0BB-DE4B-95CE-6DB70DBA9567}" type="datetimeFigureOut">
               <a:rPr lang="en-US" smtClean="0"/>
               <a:pPr/>
-              <a:t>8/11/2014</a:t>
+              <a:t>8/12/2014</a:t>
             </a:fld>
             <a:endParaRPr lang="en-US" dirty="0"/>
           </a:p>
@@ -6113,7 +6113,7 @@
             <a:fld id="{B61BEF0D-F0BB-DE4B-95CE-6DB70DBA9567}" type="datetimeFigureOut">
               <a:rPr lang="en-US" smtClean="0"/>
               <a:pPr/>
-              <a:t>8/11/2014</a:t>
+              <a:t>8/12/2014</a:t>
             </a:fld>
             <a:endParaRPr lang="en-US" dirty="0"/>
           </a:p>
@@ -6835,7 +6835,7 @@
             <a:fld id="{B61BEF0D-F0BB-DE4B-95CE-6DB70DBA9567}" type="datetimeFigureOut">
               <a:rPr lang="en-US" smtClean="0"/>
               <a:pPr/>
-              <a:t>8/11/2014</a:t>
+              <a:t>8/12/2014</a:t>
             </a:fld>
             <a:endParaRPr lang="en-US" dirty="0"/>
           </a:p>
@@ -7007,7 +7007,7 @@
             <a:fld id="{B61BEF0D-F0BB-DE4B-95CE-6DB70DBA9567}" type="datetimeFigureOut">
               <a:rPr lang="en-US" smtClean="0"/>
               <a:pPr/>
-              <a:t>8/11/2014</a:t>
+              <a:t>8/12/2014</a:t>
             </a:fld>
             <a:endParaRPr lang="en-US" dirty="0"/>
           </a:p>
@@ -7189,7 +7189,7 @@
             <a:fld id="{B61BEF0D-F0BB-DE4B-95CE-6DB70DBA9567}" type="datetimeFigureOut">
               <a:rPr lang="en-US" smtClean="0"/>
               <a:pPr/>
-              <a:t>8/11/2014</a:t>
+              <a:t>8/12/2014</a:t>
             </a:fld>
             <a:endParaRPr lang="en-US" dirty="0"/>
           </a:p>
@@ -7361,7 +7361,7 @@
             <a:fld id="{B61BEF0D-F0BB-DE4B-95CE-6DB70DBA9567}" type="datetimeFigureOut">
               <a:rPr lang="en-US" smtClean="0"/>
               <a:pPr/>
-              <a:t>8/11/2014</a:t>
+              <a:t>8/12/2014</a:t>
             </a:fld>
             <a:endParaRPr lang="en-US" dirty="0"/>
           </a:p>
@@ -7613,7 +7613,7 @@
             <a:fld id="{B61BEF0D-F0BB-DE4B-95CE-6DB70DBA9567}" type="datetimeFigureOut">
               <a:rPr lang="en-US" smtClean="0"/>
               <a:pPr/>
-              <a:t>8/11/2014</a:t>
+              <a:t>8/12/2014</a:t>
             </a:fld>
             <a:endParaRPr lang="en-US" dirty="0"/>
           </a:p>
@@ -7847,7 +7847,7 @@
             <a:fld id="{B61BEF0D-F0BB-DE4B-95CE-6DB70DBA9567}" type="datetimeFigureOut">
               <a:rPr lang="en-US" smtClean="0"/>
               <a:pPr/>
-              <a:t>8/11/2014</a:t>
+              <a:t>8/12/2014</a:t>
             </a:fld>
             <a:endParaRPr lang="en-US" dirty="0"/>
           </a:p>
@@ -8230,7 +8230,7 @@
             <a:fld id="{B61BEF0D-F0BB-DE4B-95CE-6DB70DBA9567}" type="datetimeFigureOut">
               <a:rPr lang="en-US" smtClean="0"/>
               <a:pPr/>
-              <a:t>8/11/2014</a:t>
+              <a:t>8/12/2014</a:t>
             </a:fld>
             <a:endParaRPr lang="en-US" dirty="0"/>
           </a:p>
@@ -8350,7 +8350,7 @@
             <a:fld id="{B61BEF0D-F0BB-DE4B-95CE-6DB70DBA9567}" type="datetimeFigureOut">
               <a:rPr lang="en-US" smtClean="0"/>
               <a:pPr/>
-              <a:t>8/11/2014</a:t>
+              <a:t>8/12/2014</a:t>
             </a:fld>
             <a:endParaRPr lang="en-US" dirty="0"/>
           </a:p>
@@ -8447,7 +8447,7 @@
             <a:fld id="{B61BEF0D-F0BB-DE4B-95CE-6DB70DBA9567}" type="datetimeFigureOut">
               <a:rPr lang="en-US" smtClean="0"/>
               <a:pPr/>
-              <a:t>8/11/2014</a:t>
+              <a:t>8/12/2014</a:t>
             </a:fld>
             <a:endParaRPr lang="en-US" dirty="0"/>
           </a:p>
@@ -8698,7 +8698,7 @@
             <a:fld id="{B61BEF0D-F0BB-DE4B-95CE-6DB70DBA9567}" type="datetimeFigureOut">
               <a:rPr lang="en-US" smtClean="0"/>
               <a:pPr/>
-              <a:t>8/11/2014</a:t>
+              <a:t>8/12/2014</a:t>
             </a:fld>
             <a:endParaRPr lang="en-US" dirty="0"/>
           </a:p>
@@ -8980,7 +8980,7 @@
             <a:fld id="{B61BEF0D-F0BB-DE4B-95CE-6DB70DBA9567}" type="datetimeFigureOut">
               <a:rPr lang="en-US" smtClean="0"/>
               <a:pPr/>
-              <a:t>8/11/2014</a:t>
+              <a:t>8/12/2014</a:t>
             </a:fld>
             <a:endParaRPr lang="en-US" dirty="0"/>
           </a:p>
@@ -9097,7 +9097,7 @@
           <a:noFill/>
           <a:extLst>
             <a:ext uri="{909E8E84-426E-40dd-AFC4-6F175D3DCCD1}">
-              <a14:hiddenFill xmlns="" xmlns:a14="http://schemas.microsoft.com/office/drawing/2010/main">
+              <a14:hiddenFill xmlns:a14="http://schemas.microsoft.com/office/drawing/2010/main" xmlns="">
                 <a:solidFill>
                   <a:srgbClr val="FFFFFF"/>
                 </a:solidFill>
@@ -9171,7 +9171,7 @@
               </a:ln>
               <a:extLst>
                 <a:ext uri="{91240B29-F687-4f45-9708-019B960494DF}">
-                  <a14:hiddenLine xmlns="" xmlns:a14="http://schemas.microsoft.com/office/drawing/2010/main" w="9525">
+                  <a14:hiddenLine xmlns:a14="http://schemas.microsoft.com/office/drawing/2010/main" xmlns="" w="9525">
                     <a:solidFill>
                       <a:srgbClr val="000000"/>
                     </a:solidFill>
@@ -9261,7 +9261,7 @@
               </a:ln>
               <a:extLst>
                 <a:ext uri="{91240B29-F687-4f45-9708-019B960494DF}">
-                  <a14:hiddenLine xmlns="" xmlns:a14="http://schemas.microsoft.com/office/drawing/2010/main" w="9525">
+                  <a14:hiddenLine xmlns:a14="http://schemas.microsoft.com/office/drawing/2010/main" xmlns="" w="9525">
                     <a:solidFill>
                       <a:srgbClr val="000000"/>
                     </a:solidFill>
@@ -9351,7 +9351,7 @@
               </a:ln>
               <a:extLst>
                 <a:ext uri="{91240B29-F687-4f45-9708-019B960494DF}">
-                  <a14:hiddenLine xmlns="" xmlns:a14="http://schemas.microsoft.com/office/drawing/2010/main" w="9525">
+                  <a14:hiddenLine xmlns:a14="http://schemas.microsoft.com/office/drawing/2010/main" xmlns="" w="9525">
                     <a:solidFill>
                       <a:srgbClr val="000000"/>
                     </a:solidFill>
@@ -9413,7 +9413,7 @@
               </a:ln>
               <a:extLst>
                 <a:ext uri="{91240B29-F687-4f45-9708-019B960494DF}">
-                  <a14:hiddenLine xmlns="" xmlns:a14="http://schemas.microsoft.com/office/drawing/2010/main" w="9525">
+                  <a14:hiddenLine xmlns:a14="http://schemas.microsoft.com/office/drawing/2010/main" xmlns="" w="9525">
                     <a:solidFill>
                       <a:srgbClr val="000000"/>
                     </a:solidFill>
@@ -9503,7 +9503,7 @@
               </a:ln>
               <a:extLst>
                 <a:ext uri="{91240B29-F687-4f45-9708-019B960494DF}">
-                  <a14:hiddenLine xmlns="" xmlns:a14="http://schemas.microsoft.com/office/drawing/2010/main" w="9525">
+                  <a14:hiddenLine xmlns:a14="http://schemas.microsoft.com/office/drawing/2010/main" xmlns="" w="9525">
                     <a:solidFill>
                       <a:srgbClr val="000000"/>
                     </a:solidFill>
@@ -9565,7 +9565,7 @@
               </a:ln>
               <a:extLst>
                 <a:ext uri="{91240B29-F687-4f45-9708-019B960494DF}">
-                  <a14:hiddenLine xmlns="" xmlns:a14="http://schemas.microsoft.com/office/drawing/2010/main" w="9525">
+                  <a14:hiddenLine xmlns:a14="http://schemas.microsoft.com/office/drawing/2010/main" xmlns="" w="9525">
                     <a:solidFill>
                       <a:srgbClr val="000000"/>
                     </a:solidFill>
@@ -9627,7 +9627,7 @@
               </a:ln>
               <a:extLst>
                 <a:ext uri="{91240B29-F687-4f45-9708-019B960494DF}">
-                  <a14:hiddenLine xmlns="" xmlns:a14="http://schemas.microsoft.com/office/drawing/2010/main" w="9525">
+                  <a14:hiddenLine xmlns:a14="http://schemas.microsoft.com/office/drawing/2010/main" xmlns="" w="9525">
                     <a:solidFill>
                       <a:srgbClr val="000000"/>
                     </a:solidFill>
@@ -9717,7 +9717,7 @@
               </a:ln>
               <a:extLst>
                 <a:ext uri="{91240B29-F687-4f45-9708-019B960494DF}">
-                  <a14:hiddenLine xmlns="" xmlns:a14="http://schemas.microsoft.com/office/drawing/2010/main" w="9525">
+                  <a14:hiddenLine xmlns:a14="http://schemas.microsoft.com/office/drawing/2010/main" xmlns="" w="9525">
                     <a:solidFill>
                       <a:srgbClr val="000000"/>
                     </a:solidFill>
@@ -9807,7 +9807,7 @@
               </a:ln>
               <a:extLst>
                 <a:ext uri="{91240B29-F687-4f45-9708-019B960494DF}">
-                  <a14:hiddenLine xmlns="" xmlns:a14="http://schemas.microsoft.com/office/drawing/2010/main" w="9525">
+                  <a14:hiddenLine xmlns:a14="http://schemas.microsoft.com/office/drawing/2010/main" xmlns="" w="9525">
                     <a:solidFill>
                       <a:srgbClr val="000000"/>
                     </a:solidFill>
@@ -9869,7 +9869,7 @@
               </a:ln>
               <a:extLst>
                 <a:ext uri="{91240B29-F687-4f45-9708-019B960494DF}">
-                  <a14:hiddenLine xmlns="" xmlns:a14="http://schemas.microsoft.com/office/drawing/2010/main" w="9525">
+                  <a14:hiddenLine xmlns:a14="http://schemas.microsoft.com/office/drawing/2010/main" xmlns="" w="9525">
                     <a:solidFill>
                       <a:srgbClr val="000000"/>
                     </a:solidFill>
@@ -9979,7 +9979,7 @@
               </a:ln>
               <a:extLst>
                 <a:ext uri="{91240B29-F687-4f45-9708-019B960494DF}">
-                  <a14:hiddenLine xmlns="" xmlns:a14="http://schemas.microsoft.com/office/drawing/2010/main" w="9525">
+                  <a14:hiddenLine xmlns:a14="http://schemas.microsoft.com/office/drawing/2010/main" xmlns="" w="9525">
                     <a:solidFill>
                       <a:srgbClr val="000000"/>
                     </a:solidFill>
@@ -10063,7 +10063,7 @@
               </a:ln>
               <a:extLst>
                 <a:ext uri="{91240B29-F687-4f45-9708-019B960494DF}">
-                  <a14:hiddenLine xmlns="" xmlns:a14="http://schemas.microsoft.com/office/drawing/2010/main" w="9525">
+                  <a14:hiddenLine xmlns:a14="http://schemas.microsoft.com/office/drawing/2010/main" xmlns="" w="9525">
                     <a:solidFill>
                       <a:srgbClr val="000000"/>
                     </a:solidFill>
@@ -10125,7 +10125,7 @@
               </a:ln>
               <a:extLst>
                 <a:ext uri="{91240B29-F687-4f45-9708-019B960494DF}">
-                  <a14:hiddenLine xmlns="" xmlns:a14="http://schemas.microsoft.com/office/drawing/2010/main" w="9525">
+                  <a14:hiddenLine xmlns:a14="http://schemas.microsoft.com/office/drawing/2010/main" xmlns="" w="9525">
                     <a:solidFill>
                       <a:srgbClr val="000000"/>
                     </a:solidFill>
@@ -10187,7 +10187,7 @@
               </a:ln>
               <a:extLst>
                 <a:ext uri="{91240B29-F687-4f45-9708-019B960494DF}">
-                  <a14:hiddenLine xmlns="" xmlns:a14="http://schemas.microsoft.com/office/drawing/2010/main" w="9525">
+                  <a14:hiddenLine xmlns:a14="http://schemas.microsoft.com/office/drawing/2010/main" xmlns="" w="9525">
                     <a:solidFill>
                       <a:srgbClr val="000000"/>
                     </a:solidFill>
@@ -10277,7 +10277,7 @@
               </a:ln>
               <a:extLst>
                 <a:ext uri="{91240B29-F687-4f45-9708-019B960494DF}">
-                  <a14:hiddenLine xmlns="" xmlns:a14="http://schemas.microsoft.com/office/drawing/2010/main" w="9525">
+                  <a14:hiddenLine xmlns:a14="http://schemas.microsoft.com/office/drawing/2010/main" xmlns="" w="9525">
                     <a:solidFill>
                       <a:srgbClr val="000000"/>
                     </a:solidFill>
@@ -10311,7 +10311,7 @@
               </a:ln>
               <a:extLst>
                 <a:ext uri="{91240B29-F687-4f45-9708-019B960494DF}">
-                  <a14:hiddenLine xmlns="" xmlns:a14="http://schemas.microsoft.com/office/drawing/2010/main" w="9525">
+                  <a14:hiddenLine xmlns:a14="http://schemas.microsoft.com/office/drawing/2010/main" xmlns="" w="9525">
                     <a:solidFill>
                       <a:srgbClr val="000000"/>
                     </a:solidFill>
@@ -10376,7 +10376,7 @@
               </a:ln>
               <a:extLst>
                 <a:ext uri="{91240B29-F687-4f45-9708-019B960494DF}">
-                  <a14:hiddenLine xmlns="" xmlns:a14="http://schemas.microsoft.com/office/drawing/2010/main" w="9525">
+                  <a14:hiddenLine xmlns:a14="http://schemas.microsoft.com/office/drawing/2010/main" xmlns="" w="9525">
                     <a:solidFill>
                       <a:srgbClr val="000000"/>
                     </a:solidFill>
@@ -10466,7 +10466,7 @@
               </a:ln>
               <a:extLst>
                 <a:ext uri="{91240B29-F687-4f45-9708-019B960494DF}">
-                  <a14:hiddenLine xmlns="" xmlns:a14="http://schemas.microsoft.com/office/drawing/2010/main" w="9525">
+                  <a14:hiddenLine xmlns:a14="http://schemas.microsoft.com/office/drawing/2010/main" xmlns="" w="9525">
                     <a:solidFill>
                       <a:srgbClr val="000000"/>
                     </a:solidFill>
@@ -10528,7 +10528,7 @@
               </a:ln>
               <a:extLst>
                 <a:ext uri="{91240B29-F687-4f45-9708-019B960494DF}">
-                  <a14:hiddenLine xmlns="" xmlns:a14="http://schemas.microsoft.com/office/drawing/2010/main" w="9525">
+                  <a14:hiddenLine xmlns:a14="http://schemas.microsoft.com/office/drawing/2010/main" xmlns="" w="9525">
                     <a:solidFill>
                       <a:srgbClr val="000000"/>
                     </a:solidFill>
@@ -10618,7 +10618,7 @@
               </a:ln>
               <a:extLst>
                 <a:ext uri="{91240B29-F687-4f45-9708-019B960494DF}">
-                  <a14:hiddenLine xmlns="" xmlns:a14="http://schemas.microsoft.com/office/drawing/2010/main" w="9525">
+                  <a14:hiddenLine xmlns:a14="http://schemas.microsoft.com/office/drawing/2010/main" xmlns="" w="9525">
                     <a:solidFill>
                       <a:srgbClr val="000000"/>
                     </a:solidFill>
@@ -10683,7 +10683,7 @@
               </a:ln>
               <a:extLst>
                 <a:ext uri="{91240B29-F687-4f45-9708-019B960494DF}">
-                  <a14:hiddenLine xmlns="" xmlns:a14="http://schemas.microsoft.com/office/drawing/2010/main" w="9525">
+                  <a14:hiddenLine xmlns:a14="http://schemas.microsoft.com/office/drawing/2010/main" xmlns="" w="9525">
                     <a:solidFill>
                       <a:srgbClr val="000000"/>
                     </a:solidFill>
@@ -10745,7 +10745,7 @@
               </a:ln>
               <a:extLst>
                 <a:ext uri="{91240B29-F687-4f45-9708-019B960494DF}">
-                  <a14:hiddenLine xmlns="" xmlns:a14="http://schemas.microsoft.com/office/drawing/2010/main" w="9525">
+                  <a14:hiddenLine xmlns:a14="http://schemas.microsoft.com/office/drawing/2010/main" xmlns="" w="9525">
                     <a:solidFill>
                       <a:srgbClr val="000000"/>
                     </a:solidFill>
@@ -10835,7 +10835,7 @@
               </a:ln>
               <a:extLst>
                 <a:ext uri="{91240B29-F687-4f45-9708-019B960494DF}">
-                  <a14:hiddenLine xmlns="" xmlns:a14="http://schemas.microsoft.com/office/drawing/2010/main" w="9525">
+                  <a14:hiddenLine xmlns:a14="http://schemas.microsoft.com/office/drawing/2010/main" xmlns="" w="9525">
                     <a:solidFill>
                       <a:srgbClr val="000000"/>
                     </a:solidFill>
@@ -10925,7 +10925,7 @@
               </a:ln>
               <a:extLst>
                 <a:ext uri="{91240B29-F687-4f45-9708-019B960494DF}">
-                  <a14:hiddenLine xmlns="" xmlns:a14="http://schemas.microsoft.com/office/drawing/2010/main" w="9525">
+                  <a14:hiddenLine xmlns:a14="http://schemas.microsoft.com/office/drawing/2010/main" xmlns="" w="9525">
                     <a:solidFill>
                       <a:srgbClr val="000000"/>
                     </a:solidFill>
@@ -10990,7 +10990,7 @@
               </a:ln>
               <a:extLst>
                 <a:ext uri="{91240B29-F687-4f45-9708-019B960494DF}">
-                  <a14:hiddenLine xmlns="" xmlns:a14="http://schemas.microsoft.com/office/drawing/2010/main" w="9525">
+                  <a14:hiddenLine xmlns:a14="http://schemas.microsoft.com/office/drawing/2010/main" xmlns="" w="9525">
                     <a:solidFill>
                       <a:srgbClr val="000000"/>
                     </a:solidFill>
@@ -11110,7 +11110,7 @@
               </a:ln>
               <a:extLst>
                 <a:ext uri="{91240B29-F687-4f45-9708-019B960494DF}">
-                  <a14:hiddenLine xmlns="" xmlns:a14="http://schemas.microsoft.com/office/drawing/2010/main" w="9525">
+                  <a14:hiddenLine xmlns:a14="http://schemas.microsoft.com/office/drawing/2010/main" xmlns="" w="9525">
                     <a:solidFill>
                       <a:srgbClr val="000000"/>
                     </a:solidFill>
@@ -11208,7 +11208,7 @@
               </a:ln>
               <a:extLst>
                 <a:ext uri="{91240B29-F687-4f45-9708-019B960494DF}">
-                  <a14:hiddenLine xmlns="" xmlns:a14="http://schemas.microsoft.com/office/drawing/2010/main" w="9525">
+                  <a14:hiddenLine xmlns:a14="http://schemas.microsoft.com/office/drawing/2010/main" xmlns="" w="9525">
                     <a:solidFill>
                       <a:srgbClr val="000000"/>
                     </a:solidFill>
@@ -11323,7 +11323,7 @@
               </a:ln>
               <a:extLst>
                 <a:ext uri="{91240B29-F687-4f45-9708-019B960494DF}">
-                  <a14:hiddenLine xmlns="" xmlns:a14="http://schemas.microsoft.com/office/drawing/2010/main" w="9525">
+                  <a14:hiddenLine xmlns:a14="http://schemas.microsoft.com/office/drawing/2010/main" xmlns="" w="9525">
                     <a:solidFill>
                       <a:srgbClr val="000000"/>
                     </a:solidFill>
@@ -11413,7 +11413,7 @@
               </a:ln>
               <a:extLst>
                 <a:ext uri="{91240B29-F687-4f45-9708-019B960494DF}">
-                  <a14:hiddenLine xmlns="" xmlns:a14="http://schemas.microsoft.com/office/drawing/2010/main" w="9525">
+                  <a14:hiddenLine xmlns:a14="http://schemas.microsoft.com/office/drawing/2010/main" xmlns="" w="9525">
                     <a:solidFill>
                       <a:srgbClr val="000000"/>
                     </a:solidFill>
@@ -11478,7 +11478,7 @@
               </a:ln>
               <a:extLst>
                 <a:ext uri="{91240B29-F687-4f45-9708-019B960494DF}">
-                  <a14:hiddenLine xmlns="" xmlns:a14="http://schemas.microsoft.com/office/drawing/2010/main" w="9525">
+                  <a14:hiddenLine xmlns:a14="http://schemas.microsoft.com/office/drawing/2010/main" xmlns="" w="9525">
                     <a:solidFill>
                       <a:srgbClr val="000000"/>
                     </a:solidFill>
@@ -11568,7 +11568,7 @@
               </a:ln>
               <a:extLst>
                 <a:ext uri="{91240B29-F687-4f45-9708-019B960494DF}">
-                  <a14:hiddenLine xmlns="" xmlns:a14="http://schemas.microsoft.com/office/drawing/2010/main" w="9525">
+                  <a14:hiddenLine xmlns:a14="http://schemas.microsoft.com/office/drawing/2010/main" xmlns="" w="9525">
                     <a:solidFill>
                       <a:srgbClr val="000000"/>
                     </a:solidFill>
@@ -11636,7 +11636,7 @@
               </a:ln>
               <a:extLst>
                 <a:ext uri="{91240B29-F687-4f45-9708-019B960494DF}">
-                  <a14:hiddenLine xmlns="" xmlns:a14="http://schemas.microsoft.com/office/drawing/2010/main" w="9525">
+                  <a14:hiddenLine xmlns:a14="http://schemas.microsoft.com/office/drawing/2010/main" xmlns="" w="9525">
                     <a:solidFill>
                       <a:srgbClr val="000000"/>
                     </a:solidFill>
@@ -11726,7 +11726,7 @@
               </a:ln>
               <a:extLst>
                 <a:ext uri="{91240B29-F687-4f45-9708-019B960494DF}">
-                  <a14:hiddenLine xmlns="" xmlns:a14="http://schemas.microsoft.com/office/drawing/2010/main" w="9525">
+                  <a14:hiddenLine xmlns:a14="http://schemas.microsoft.com/office/drawing/2010/main" xmlns="" w="9525">
                     <a:solidFill>
                       <a:srgbClr val="000000"/>
                     </a:solidFill>
@@ -11794,7 +11794,7 @@
               </a:ln>
               <a:extLst>
                 <a:ext uri="{91240B29-F687-4f45-9708-019B960494DF}">
-                  <a14:hiddenLine xmlns="" xmlns:a14="http://schemas.microsoft.com/office/drawing/2010/main" w="9525">
+                  <a14:hiddenLine xmlns:a14="http://schemas.microsoft.com/office/drawing/2010/main" xmlns="" w="9525">
                     <a:solidFill>
                       <a:srgbClr val="000000"/>
                     </a:solidFill>
@@ -11884,7 +11884,7 @@
               </a:ln>
               <a:extLst>
                 <a:ext uri="{91240B29-F687-4f45-9708-019B960494DF}">
-                  <a14:hiddenLine xmlns="" xmlns:a14="http://schemas.microsoft.com/office/drawing/2010/main" w="9525">
+                  <a14:hiddenLine xmlns:a14="http://schemas.microsoft.com/office/drawing/2010/main" xmlns="" w="9525">
                     <a:solidFill>
                       <a:srgbClr val="000000"/>
                     </a:solidFill>
@@ -11918,7 +11918,7 @@
               </a:ln>
               <a:extLst>
                 <a:ext uri="{91240B29-F687-4f45-9708-019B960494DF}">
-                  <a14:hiddenLine xmlns="" xmlns:a14="http://schemas.microsoft.com/office/drawing/2010/main" w="9525">
+                  <a14:hiddenLine xmlns:a14="http://schemas.microsoft.com/office/drawing/2010/main" xmlns="" w="9525">
                     <a:solidFill>
                       <a:srgbClr val="000000"/>
                     </a:solidFill>
@@ -12059,7 +12059,7 @@
             <a:fld id="{B61BEF0D-F0BB-DE4B-95CE-6DB70DBA9567}" type="datetimeFigureOut">
               <a:rPr lang="en-US" smtClean="0"/>
               <a:pPr/>
-              <a:t>8/11/2014</a:t>
+              <a:t>8/12/2014</a:t>
             </a:fld>
             <a:endParaRPr lang="en-US" dirty="0"/>
           </a:p>
@@ -13008,29 +13008,6 @@
           </a:p>
         </p:txBody>
       </p:sp>
-      <p:pic>
-        <p:nvPicPr>
-          <p:cNvPr id="8" name="Picture Placeholder 7"/>
-          <p:cNvPicPr>
-            <a:picLocks noGrp="1" noChangeAspect="1"/>
-          </p:cNvPicPr>
-          <p:nvPr>
-            <p:ph type="pic" idx="1"/>
-          </p:nvPr>
-        </p:nvPicPr>
-        <p:blipFill>
-          <a:blip r:embed="rId2"/>
-          <a:srcRect l="5767" r="5767"/>
-          <a:stretch>
-            <a:fillRect/>
-          </a:stretch>
-        </p:blipFill>
-        <p:spPr>
-          <a:prstGeom prst="rect">
-            <a:avLst/>
-          </a:prstGeom>
-        </p:spPr>
-      </p:pic>
       <p:sp>
         <p:nvSpPr>
           <p:cNvPr id="7" name="Text Placeholder 6"/>
@@ -13049,6 +13026,18 @@
             <a:endParaRPr lang="en-US"/>
           </a:p>
         </p:txBody>
+      </p:sp>
+      <p:sp>
+        <p:nvSpPr>
+          <p:cNvPr id="2" name="Picture Placeholder 1"/>
+          <p:cNvSpPr>
+            <a:spLocks noGrp="1"/>
+          </p:cNvSpPr>
+          <p:nvPr>
+            <p:ph type="pic" idx="1"/>
+          </p:nvPr>
+        </p:nvSpPr>
+        <p:spPr/>
       </p:sp>
     </p:spTree>
     <p:extLst>

</xml_diff>